<commit_message>
ds전체 time  UInt32 msec로 통일
</commit_message>
<xml_diff>
--- a/DsDotNet/src/UnitTest/UnitTest.Model/ImportOfficeExample/ppt/T7_CopySystem.pptx
+++ b/DsDotNet/src/UnitTest/UnitTest.Model/ImportOfficeExample/ppt/T7_CopySystem.pptx
@@ -216,7 +216,7 @@
           <a:p>
             <a:fld id="{DD503887-5801-43A0-AEF9-041E8DDC2558}" type="datetimeFigureOut">
               <a:rPr lang="ko-KR" altLang="en-US" smtClean="0"/>
-              <a:t>2024-05-27</a:t>
+              <a:t>2024-10-15</a:t>
             </a:fld>
             <a:endParaRPr lang="ko-KR" altLang="en-US"/>
           </a:p>
@@ -393,7 +393,7 @@
           <a:p>
             <a:fld id="{95336A0E-57B1-4D4C-BD9B-2F72B5943464}" type="datetimeFigureOut">
               <a:rPr lang="ko-KR" altLang="en-US" smtClean="0"/>
-              <a:t>2024-05-27</a:t>
+              <a:t>2024-10-15</a:t>
             </a:fld>
             <a:endParaRPr lang="ko-KR" altLang="en-US"/>
           </a:p>
@@ -755,7 +755,7 @@
           <a:effectLst/>
           <a:extLst>
             <a:ext uri="{91240B29-F687-4f45-9708-019B960494DF}">
-              <a14:hiddenLine xmlns="" xmlns:a14="http://schemas.microsoft.com/office/drawing/2010/main" w="9525">
+              <a14:hiddenLine xmlns:a14="http://schemas.microsoft.com/office/drawing/2010/main" xmlns="" w="9525">
                 <a:solidFill>
                   <a:srgbClr val="000000"/>
                 </a:solidFill>
@@ -947,7 +947,7 @@
           <a:p>
             <a:fld id="{DEA6EBF0-8E22-42A7-9BEA-2AC7066E6498}" type="datetimeFigureOut">
               <a:rPr lang="ko-KR" altLang="en-US" smtClean="0"/>
-              <a:t>2024-05-27</a:t>
+              <a:t>2024-10-15</a:t>
             </a:fld>
             <a:endParaRPr lang="ko-KR" altLang="en-US"/>
           </a:p>
@@ -1265,7 +1265,7 @@
           <a:p>
             <a:fld id="{DEA6EBF0-8E22-42A7-9BEA-2AC7066E6498}" type="datetimeFigureOut">
               <a:rPr lang="ko-KR" altLang="en-US" smtClean="0"/>
-              <a:t>2024-05-27</a:t>
+              <a:t>2024-10-15</a:t>
             </a:fld>
             <a:endParaRPr lang="ko-KR" altLang="en-US"/>
           </a:p>
@@ -1753,7 +1753,7 @@
           <a:p>
             <a:fld id="{DEA6EBF0-8E22-42A7-9BEA-2AC7066E6498}" type="datetimeFigureOut">
               <a:rPr lang="ko-KR" altLang="en-US" smtClean="0"/>
-              <a:t>2024-05-27</a:t>
+              <a:t>2024-10-15</a:t>
             </a:fld>
             <a:endParaRPr lang="ko-KR" altLang="en-US"/>
           </a:p>
@@ -2122,7 +2122,7 @@
           <a:p>
             <a:fld id="{DEA6EBF0-8E22-42A7-9BEA-2AC7066E6498}" type="datetimeFigureOut">
               <a:rPr lang="ko-KR" altLang="en-US" smtClean="0"/>
-              <a:t>2024-05-27</a:t>
+              <a:t>2024-10-15</a:t>
             </a:fld>
             <a:endParaRPr lang="ko-KR" altLang="en-US"/>
           </a:p>
@@ -2277,7 +2277,7 @@
           <a:ln/>
           <a:extLst>
             <a:ext uri="{91240B29-F687-4f45-9708-019B960494DF}">
-              <a14:hiddenLine xmlns="" xmlns:a14="http://schemas.microsoft.com/office/drawing/2010/main" w="9525">
+              <a14:hiddenLine xmlns:a14="http://schemas.microsoft.com/office/drawing/2010/main" xmlns="" w="9525">
                 <a:solidFill>
                   <a:srgbClr val="000000"/>
                 </a:solidFill>
@@ -2395,7 +2395,7 @@
           <a:p>
             <a:fld id="{DEA6EBF0-8E22-42A7-9BEA-2AC7066E6498}" type="datetimeFigureOut">
               <a:rPr lang="ko-KR" altLang="en-US" smtClean="0"/>
-              <a:t>2024-05-27</a:t>
+              <a:t>2024-10-15</a:t>
             </a:fld>
             <a:endParaRPr lang="ko-KR" altLang="en-US"/>
           </a:p>
@@ -2552,7 +2552,7 @@
           <a:ln/>
           <a:extLst>
             <a:ext uri="{91240B29-F687-4f45-9708-019B960494DF}">
-              <a14:hiddenLine xmlns="" xmlns:a14="http://schemas.microsoft.com/office/drawing/2010/main" w="9525">
+              <a14:hiddenLine xmlns:a14="http://schemas.microsoft.com/office/drawing/2010/main" xmlns="" w="9525">
                 <a:solidFill>
                   <a:srgbClr val="000000"/>
                 </a:solidFill>
@@ -2680,7 +2680,7 @@
           <a:p>
             <a:fld id="{DEA6EBF0-8E22-42A7-9BEA-2AC7066E6498}" type="datetimeFigureOut">
               <a:rPr lang="ko-KR" altLang="en-US" smtClean="0"/>
-              <a:t>2024-05-27</a:t>
+              <a:t>2024-10-15</a:t>
             </a:fld>
             <a:endParaRPr lang="ko-KR" altLang="en-US"/>
           </a:p>
@@ -2798,7 +2798,7 @@
           <a:p>
             <a:fld id="{DEA6EBF0-8E22-42A7-9BEA-2AC7066E6498}" type="datetimeFigureOut">
               <a:rPr lang="ko-KR" altLang="en-US" smtClean="0"/>
-              <a:t>2024-05-27</a:t>
+              <a:t>2024-10-15</a:t>
             </a:fld>
             <a:endParaRPr lang="ko-KR" altLang="en-US"/>
           </a:p>
@@ -2953,7 +2953,7 @@
           <a:ln/>
           <a:extLst>
             <a:ext uri="{91240B29-F687-4f45-9708-019B960494DF}">
-              <a14:hiddenLine xmlns="" xmlns:a14="http://schemas.microsoft.com/office/drawing/2010/main" w="9525">
+              <a14:hiddenLine xmlns:a14="http://schemas.microsoft.com/office/drawing/2010/main" xmlns="" w="9525">
                 <a:solidFill>
                   <a:srgbClr val="000000"/>
                 </a:solidFill>
@@ -3081,7 +3081,7 @@
           <a:p>
             <a:fld id="{DEA6EBF0-8E22-42A7-9BEA-2AC7066E6498}" type="datetimeFigureOut">
               <a:rPr lang="ko-KR" altLang="en-US" smtClean="0"/>
-              <a:t>2024-05-27</a:t>
+              <a:t>2024-10-15</a:t>
             </a:fld>
             <a:endParaRPr lang="ko-KR" altLang="en-US"/>
           </a:p>
@@ -3424,7 +3424,7 @@
           <a:p>
             <a:fld id="{DEA6EBF0-8E22-42A7-9BEA-2AC7066E6498}" type="datetimeFigureOut">
               <a:rPr lang="ko-KR" altLang="en-US" smtClean="0"/>
-              <a:t>2024-05-27</a:t>
+              <a:t>2024-10-15</a:t>
             </a:fld>
             <a:endParaRPr lang="ko-KR" altLang="en-US"/>
           </a:p>
@@ -3579,7 +3579,7 @@
           <a:ln/>
           <a:extLst>
             <a:ext uri="{91240B29-F687-4f45-9708-019B960494DF}">
-              <a14:hiddenLine xmlns="" xmlns:a14="http://schemas.microsoft.com/office/drawing/2010/main" w="9525">
+              <a14:hiddenLine xmlns:a14="http://schemas.microsoft.com/office/drawing/2010/main" xmlns="" w="9525">
                 <a:solidFill>
                   <a:srgbClr val="000000"/>
                 </a:solidFill>
@@ -3763,7 +3763,7 @@
           <a:p>
             <a:fld id="{DEA6EBF0-8E22-42A7-9BEA-2AC7066E6498}" type="datetimeFigureOut">
               <a:rPr lang="ko-KR" altLang="en-US" smtClean="0"/>
-              <a:t>2024-05-27</a:t>
+              <a:t>2024-10-15</a:t>
             </a:fld>
             <a:endParaRPr lang="ko-KR" altLang="en-US"/>
           </a:p>
@@ -3918,7 +3918,7 @@
           <a:ln/>
           <a:extLst>
             <a:ext uri="{91240B29-F687-4f45-9708-019B960494DF}">
-              <a14:hiddenLine xmlns="" xmlns:a14="http://schemas.microsoft.com/office/drawing/2010/main" w="9525">
+              <a14:hiddenLine xmlns:a14="http://schemas.microsoft.com/office/drawing/2010/main" xmlns="" w="9525">
                 <a:solidFill>
                   <a:srgbClr val="000000"/>
                 </a:solidFill>
@@ -4240,7 +4240,7 @@
           <a:p>
             <a:fld id="{DEA6EBF0-8E22-42A7-9BEA-2AC7066E6498}" type="datetimeFigureOut">
               <a:rPr lang="ko-KR" altLang="en-US" smtClean="0"/>
-              <a:t>2024-05-27</a:t>
+              <a:t>2024-10-15</a:t>
             </a:fld>
             <a:endParaRPr lang="ko-KR" altLang="en-US"/>
           </a:p>
@@ -4335,7 +4335,7 @@
           <a:p>
             <a:fld id="{DEA6EBF0-8E22-42A7-9BEA-2AC7066E6498}" type="datetimeFigureOut">
               <a:rPr lang="ko-KR" altLang="en-US" smtClean="0"/>
-              <a:t>2024-05-27</a:t>
+              <a:t>2024-10-15</a:t>
             </a:fld>
             <a:endParaRPr lang="ko-KR" altLang="en-US"/>
           </a:p>
@@ -4603,7 +4603,7 @@
           <a:ln/>
           <a:extLst>
             <a:ext uri="{91240B29-F687-4f45-9708-019B960494DF}">
-              <a14:hiddenLine xmlns="" xmlns:a14="http://schemas.microsoft.com/office/drawing/2010/main" w="9525">
+              <a14:hiddenLine xmlns:a14="http://schemas.microsoft.com/office/drawing/2010/main" xmlns="" w="9525">
                 <a:solidFill>
                   <a:srgbClr val="000000"/>
                 </a:solidFill>
@@ -4802,7 +4802,7 @@
           <a:p>
             <a:fld id="{DEA6EBF0-8E22-42A7-9BEA-2AC7066E6498}" type="datetimeFigureOut">
               <a:rPr lang="ko-KR" altLang="en-US" smtClean="0"/>
-              <a:t>2024-05-27</a:t>
+              <a:t>2024-10-15</a:t>
             </a:fld>
             <a:endParaRPr lang="ko-KR" altLang="en-US"/>
           </a:p>
@@ -5115,7 +5115,7 @@
           <a:p>
             <a:fld id="{DEA6EBF0-8E22-42A7-9BEA-2AC7066E6498}" type="datetimeFigureOut">
               <a:rPr lang="ko-KR" altLang="en-US" smtClean="0"/>
-              <a:t>2024-05-27</a:t>
+              <a:t>2024-10-15</a:t>
             </a:fld>
             <a:endParaRPr lang="ko-KR" altLang="en-US"/>
           </a:p>
@@ -5385,7 +5385,7 @@
           <a:p>
             <a:fld id="{DEA6EBF0-8E22-42A7-9BEA-2AC7066E6498}" type="datetimeFigureOut">
               <a:rPr lang="ko-KR" altLang="en-US" smtClean="0"/>
-              <a:t>2024-05-27</a:t>
+              <a:t>2024-10-15</a:t>
             </a:fld>
             <a:endParaRPr lang="ko-KR" altLang="en-US"/>
           </a:p>
@@ -6087,10 +6087,10 @@
       </p:cxnSp>
       <p:grpSp>
         <p:nvGrpSpPr>
-          <p:cNvPr id="4" name="그룹 3">
+          <p:cNvPr id="8" name="그룹 7">
             <a:extLst>
               <a:ext uri="{FF2B5EF4-FFF2-40B4-BE49-F238E27FC236}">
-                <a16:creationId xmlns:a16="http://schemas.microsoft.com/office/drawing/2014/main" id="{4C0E8184-68E2-F9A8-DCE0-762AE0D6682F}"/>
+                <a16:creationId xmlns:a16="http://schemas.microsoft.com/office/drawing/2014/main" id="{B63AE5F1-B79C-DFF9-F19F-B1F86A905412}"/>
               </a:ext>
             </a:extLst>
           </p:cNvPr>
@@ -6219,11 +6219,11 @@
               <a:pPr algn="ctr"/>
               <a:r>
                 <a:rPr lang="en-US" altLang="ko-KR" dirty="0" err="1"/>
-                <a:t>SystemA.ADV</a:t>
+                <a:t>SystemA</a:t>
               </a:r>
               <a:r>
                 <a:rPr lang="en-US" altLang="ko-KR" dirty="0"/>
-                <a:t>[4]</a:t>
+                <a:t> [4].ADV</a:t>
               </a:r>
               <a:endParaRPr lang="ko-KR" altLang="en-US" dirty="0"/>
             </a:p>
@@ -6279,11 +6279,11 @@
               <a:pPr algn="ctr"/>
               <a:r>
                 <a:rPr lang="en-US" altLang="ko-KR" dirty="0" err="1"/>
-                <a:t>SystemA.RET</a:t>
+                <a:t>SystemA</a:t>
               </a:r>
               <a:r>
-                <a:rPr lang="en-US" altLang="ko-KR"/>
-                <a:t>[4]</a:t>
+                <a:rPr lang="en-US" altLang="ko-KR" dirty="0"/>
+                <a:t> [4].RET</a:t>
               </a:r>
               <a:endParaRPr lang="ko-KR" altLang="en-US" dirty="0"/>
             </a:p>

</xml_diff>